<commit_message>
edit the extended abstract
</commit_message>
<xml_diff>
--- a/Note.pptx
+++ b/Note.pptx
@@ -9,6 +9,7 @@
     <p:sldId id="257" r:id="rId3"/>
     <p:sldId id="258" r:id="rId4"/>
     <p:sldId id="259" r:id="rId5"/>
+    <p:sldId id="260" r:id="rId6"/>
   </p:sldIdLst>
   <p:sldSz cx="12192000" cy="6858000"/>
   <p:notesSz cx="6858000" cy="9144000"/>
@@ -262,7 +263,7 @@
           <a:p>
             <a:fld id="{2E29ED21-8C56-44B9-988C-50FDA055D0F5}" type="datetimeFigureOut">
               <a:rPr kumimoji="1" lang="ja-JP" altLang="en-US" smtClean="0"/>
-              <a:t>2026/2/19</a:t>
+              <a:t>2026/2/21</a:t>
             </a:fld>
             <a:endParaRPr kumimoji="1" lang="ja-JP" altLang="en-US"/>
           </a:p>
@@ -492,7 +493,7 @@
           <a:p>
             <a:fld id="{2E29ED21-8C56-44B9-988C-50FDA055D0F5}" type="datetimeFigureOut">
               <a:rPr kumimoji="1" lang="ja-JP" altLang="en-US" smtClean="0"/>
-              <a:t>2026/2/19</a:t>
+              <a:t>2026/2/21</a:t>
             </a:fld>
             <a:endParaRPr kumimoji="1" lang="ja-JP" altLang="en-US"/>
           </a:p>
@@ -732,7 +733,7 @@
           <a:p>
             <a:fld id="{2E29ED21-8C56-44B9-988C-50FDA055D0F5}" type="datetimeFigureOut">
               <a:rPr kumimoji="1" lang="ja-JP" altLang="en-US" smtClean="0"/>
-              <a:t>2026/2/19</a:t>
+              <a:t>2026/2/21</a:t>
             </a:fld>
             <a:endParaRPr kumimoji="1" lang="ja-JP" altLang="en-US"/>
           </a:p>
@@ -962,7 +963,7 @@
           <a:p>
             <a:fld id="{2E29ED21-8C56-44B9-988C-50FDA055D0F5}" type="datetimeFigureOut">
               <a:rPr kumimoji="1" lang="ja-JP" altLang="en-US" smtClean="0"/>
-              <a:t>2026/2/19</a:t>
+              <a:t>2026/2/21</a:t>
             </a:fld>
             <a:endParaRPr kumimoji="1" lang="ja-JP" altLang="en-US"/>
           </a:p>
@@ -1237,7 +1238,7 @@
           <a:p>
             <a:fld id="{2E29ED21-8C56-44B9-988C-50FDA055D0F5}" type="datetimeFigureOut">
               <a:rPr kumimoji="1" lang="ja-JP" altLang="en-US" smtClean="0"/>
-              <a:t>2026/2/19</a:t>
+              <a:t>2026/2/21</a:t>
             </a:fld>
             <a:endParaRPr kumimoji="1" lang="ja-JP" altLang="en-US"/>
           </a:p>
@@ -1566,7 +1567,7 @@
           <a:p>
             <a:fld id="{2E29ED21-8C56-44B9-988C-50FDA055D0F5}" type="datetimeFigureOut">
               <a:rPr kumimoji="1" lang="ja-JP" altLang="en-US" smtClean="0"/>
-              <a:t>2026/2/19</a:t>
+              <a:t>2026/2/21</a:t>
             </a:fld>
             <a:endParaRPr kumimoji="1" lang="ja-JP" altLang="en-US"/>
           </a:p>
@@ -2042,7 +2043,7 @@
           <a:p>
             <a:fld id="{2E29ED21-8C56-44B9-988C-50FDA055D0F5}" type="datetimeFigureOut">
               <a:rPr kumimoji="1" lang="ja-JP" altLang="en-US" smtClean="0"/>
-              <a:t>2026/2/19</a:t>
+              <a:t>2026/2/21</a:t>
             </a:fld>
             <a:endParaRPr kumimoji="1" lang="ja-JP" altLang="en-US"/>
           </a:p>
@@ -2183,7 +2184,7 @@
           <a:p>
             <a:fld id="{2E29ED21-8C56-44B9-988C-50FDA055D0F5}" type="datetimeFigureOut">
               <a:rPr kumimoji="1" lang="ja-JP" altLang="en-US" smtClean="0"/>
-              <a:t>2026/2/19</a:t>
+              <a:t>2026/2/21</a:t>
             </a:fld>
             <a:endParaRPr kumimoji="1" lang="ja-JP" altLang="en-US"/>
           </a:p>
@@ -2296,7 +2297,7 @@
           <a:p>
             <a:fld id="{2E29ED21-8C56-44B9-988C-50FDA055D0F5}" type="datetimeFigureOut">
               <a:rPr kumimoji="1" lang="ja-JP" altLang="en-US" smtClean="0"/>
-              <a:t>2026/2/19</a:t>
+              <a:t>2026/2/21</a:t>
             </a:fld>
             <a:endParaRPr kumimoji="1" lang="ja-JP" altLang="en-US"/>
           </a:p>
@@ -2639,7 +2640,7 @@
           <a:p>
             <a:fld id="{2E29ED21-8C56-44B9-988C-50FDA055D0F5}" type="datetimeFigureOut">
               <a:rPr kumimoji="1" lang="ja-JP" altLang="en-US" smtClean="0"/>
-              <a:t>2026/2/19</a:t>
+              <a:t>2026/2/21</a:t>
             </a:fld>
             <a:endParaRPr kumimoji="1" lang="ja-JP" altLang="en-US"/>
           </a:p>
@@ -2927,7 +2928,7 @@
           <a:p>
             <a:fld id="{2E29ED21-8C56-44B9-988C-50FDA055D0F5}" type="datetimeFigureOut">
               <a:rPr kumimoji="1" lang="ja-JP" altLang="en-US" smtClean="0"/>
-              <a:t>2026/2/19</a:t>
+              <a:t>2026/2/21</a:t>
             </a:fld>
             <a:endParaRPr kumimoji="1" lang="ja-JP" altLang="en-US"/>
           </a:p>
@@ -3200,7 +3201,7 @@
           <a:p>
             <a:fld id="{2E29ED21-8C56-44B9-988C-50FDA055D0F5}" type="datetimeFigureOut">
               <a:rPr kumimoji="1" lang="ja-JP" altLang="en-US" smtClean="0"/>
-              <a:t>2026/2/19</a:t>
+              <a:t>2026/2/21</a:t>
             </a:fld>
             <a:endParaRPr kumimoji="1" lang="ja-JP" altLang="en-US"/>
           </a:p>
@@ -4598,6 +4599,36 @@
     <p:extLst>
       <p:ext uri="{BB962C8B-B14F-4D97-AF65-F5344CB8AC3E}">
         <p14:creationId xmlns:p14="http://schemas.microsoft.com/office/powerpoint/2010/main" val="359177702"/>
+      </p:ext>
+    </p:extLst>
+  </p:cSld>
+  <p:clrMapOvr>
+    <a:masterClrMapping/>
+  </p:clrMapOvr>
+</p:sld>
+</file>
+
+<file path=ppt/slides/slide5.xml><?xml version="1.0" encoding="utf-8"?>
+<p:sld xmlns:a="http://schemas.openxmlformats.org/drawingml/2006/main" xmlns:r="http://schemas.openxmlformats.org/officeDocument/2006/relationships" xmlns:p="http://schemas.openxmlformats.org/presentationml/2006/main">
+  <p:cSld>
+    <p:spTree>
+      <p:nvGrpSpPr>
+        <p:cNvPr id="1" name=""/>
+        <p:cNvGrpSpPr/>
+        <p:nvPr/>
+      </p:nvGrpSpPr>
+      <p:grpSpPr>
+        <a:xfrm>
+          <a:off x="0" y="0"/>
+          <a:ext cx="0" cy="0"/>
+          <a:chOff x="0" y="0"/>
+          <a:chExt cx="0" cy="0"/>
+        </a:xfrm>
+      </p:grpSpPr>
+    </p:spTree>
+    <p:extLst>
+      <p:ext uri="{BB962C8B-B14F-4D97-AF65-F5344CB8AC3E}">
+        <p14:creationId xmlns:p14="http://schemas.microsoft.com/office/powerpoint/2010/main" val="909200273"/>
       </p:ext>
     </p:extLst>
   </p:cSld>

</xml_diff>